<commit_message>
Módulos e Laboratórios adicionados.
</commit_message>
<xml_diff>
--- a/LABORATÓRIOS/Módulo 07 - 1 Prática de Laboratório IV - Vetores.pptx
+++ b/LABORATÓRIOS/Módulo 07 - 1 Prática de Laboratório IV - Vetores.pptx
@@ -920,7 +920,7 @@
               <a:pPr>
                 <a:defRPr/>
               </a:pPr>
-              <a:t>29/04/2016</a:t>
+              <a:t>16/05/2016</a:t>
             </a:fld>
             <a:endParaRPr lang="pt-BR" dirty="0"/>
           </a:p>
@@ -1048,7 +1048,7 @@
               <a:pPr>
                 <a:defRPr/>
               </a:pPr>
-              <a:t>29/04/2016</a:t>
+              <a:t>16/05/2016</a:t>
             </a:fld>
             <a:endParaRPr lang="pt-BR" dirty="0"/>
           </a:p>
@@ -1176,7 +1176,7 @@
               <a:pPr>
                 <a:defRPr/>
               </a:pPr>
-              <a:t>29/04/2016</a:t>
+              <a:t>16/05/2016</a:t>
             </a:fld>
             <a:endParaRPr lang="pt-BR" dirty="0"/>
           </a:p>
@@ -1511,7 +1511,7 @@
               <a:pPr>
                 <a:defRPr/>
               </a:pPr>
-              <a:t>29/04/2016</a:t>
+              <a:t>16/05/2016</a:t>
             </a:fld>
             <a:endParaRPr lang="pt-BR" dirty="0"/>
           </a:p>
@@ -1699,7 +1699,7 @@
               <a:pPr>
                 <a:defRPr/>
               </a:pPr>
-              <a:t>29/04/2016</a:t>
+              <a:t>16/05/2016</a:t>
             </a:fld>
             <a:endParaRPr lang="pt-BR" dirty="0"/>
           </a:p>
@@ -1860,7 +1860,7 @@
               <a:pPr>
                 <a:defRPr/>
               </a:pPr>
-              <a:t>29/04/2016</a:t>
+              <a:t>16/05/2016</a:t>
             </a:fld>
             <a:endParaRPr lang="pt-BR" dirty="0"/>
           </a:p>
@@ -3152,7 +3152,7 @@
               <a:pPr>
                 <a:defRPr/>
               </a:pPr>
-              <a:t>29/04/2016</a:t>
+              <a:t>16/05/2016</a:t>
             </a:fld>
             <a:endParaRPr lang="pt-BR" dirty="0"/>
           </a:p>
@@ -3616,7 +3616,7 @@
               <a:pPr>
                 <a:defRPr/>
               </a:pPr>
-              <a:t>29/04/2016</a:t>
+              <a:t>16/05/2016</a:t>
             </a:fld>
             <a:endParaRPr lang="pt-BR" dirty="0"/>
           </a:p>
@@ -4080,7 +4080,7 @@
               <a:pPr>
                 <a:defRPr/>
               </a:pPr>
-              <a:t>29/04/2016</a:t>
+              <a:t>16/05/2016</a:t>
             </a:fld>
             <a:endParaRPr lang="pt-BR" dirty="0"/>
           </a:p>

</xml_diff>